<commit_message>
ADD model image for markdown
</commit_message>
<xml_diff>
--- a/프로젝트 정리.pptx
+++ b/프로젝트 정리.pptx
@@ -240,7 +240,7 @@
           <a:p>
             <a:fld id="{DE127406-1076-4E98-B2D8-DC3D66D4F883}" type="datetimeFigureOut">
               <a:rPr lang="ko-KR" altLang="en-US" smtClean="0"/>
-              <a:t>2022-07-11</a:t>
+              <a:t>2022-09-29</a:t>
             </a:fld>
             <a:endParaRPr lang="ko-KR" altLang="en-US"/>
           </a:p>
@@ -738,7 +738,7 @@
           <a:p>
             <a:fld id="{E2AD0C2F-5F10-419C-AFC0-158EC5865B11}" type="datetimeFigureOut">
               <a:rPr lang="ko-KR" altLang="en-US" smtClean="0"/>
-              <a:t>2022-07-11</a:t>
+              <a:t>2022-09-29</a:t>
             </a:fld>
             <a:endParaRPr lang="ko-KR" altLang="en-US"/>
           </a:p>
@@ -936,7 +936,7 @@
           <a:p>
             <a:fld id="{E2AD0C2F-5F10-419C-AFC0-158EC5865B11}" type="datetimeFigureOut">
               <a:rPr lang="ko-KR" altLang="en-US" smtClean="0"/>
-              <a:t>2022-07-11</a:t>
+              <a:t>2022-09-29</a:t>
             </a:fld>
             <a:endParaRPr lang="ko-KR" altLang="en-US"/>
           </a:p>
@@ -1144,7 +1144,7 @@
           <a:p>
             <a:fld id="{E2AD0C2F-5F10-419C-AFC0-158EC5865B11}" type="datetimeFigureOut">
               <a:rPr lang="ko-KR" altLang="en-US" smtClean="0"/>
-              <a:t>2022-07-11</a:t>
+              <a:t>2022-09-29</a:t>
             </a:fld>
             <a:endParaRPr lang="ko-KR" altLang="en-US"/>
           </a:p>
@@ -1342,7 +1342,7 @@
           <a:p>
             <a:fld id="{E2AD0C2F-5F10-419C-AFC0-158EC5865B11}" type="datetimeFigureOut">
               <a:rPr lang="ko-KR" altLang="en-US" smtClean="0"/>
-              <a:t>2022-07-11</a:t>
+              <a:t>2022-09-29</a:t>
             </a:fld>
             <a:endParaRPr lang="ko-KR" altLang="en-US"/>
           </a:p>
@@ -1617,7 +1617,7 @@
           <a:p>
             <a:fld id="{E2AD0C2F-5F10-419C-AFC0-158EC5865B11}" type="datetimeFigureOut">
               <a:rPr lang="ko-KR" altLang="en-US" smtClean="0"/>
-              <a:t>2022-07-11</a:t>
+              <a:t>2022-09-29</a:t>
             </a:fld>
             <a:endParaRPr lang="ko-KR" altLang="en-US"/>
           </a:p>
@@ -1882,7 +1882,7 @@
           <a:p>
             <a:fld id="{E2AD0C2F-5F10-419C-AFC0-158EC5865B11}" type="datetimeFigureOut">
               <a:rPr lang="ko-KR" altLang="en-US" smtClean="0"/>
-              <a:t>2022-07-11</a:t>
+              <a:t>2022-09-29</a:t>
             </a:fld>
             <a:endParaRPr lang="ko-KR" altLang="en-US"/>
           </a:p>
@@ -2294,7 +2294,7 @@
           <a:p>
             <a:fld id="{E2AD0C2F-5F10-419C-AFC0-158EC5865B11}" type="datetimeFigureOut">
               <a:rPr lang="ko-KR" altLang="en-US" smtClean="0"/>
-              <a:t>2022-07-11</a:t>
+              <a:t>2022-09-29</a:t>
             </a:fld>
             <a:endParaRPr lang="ko-KR" altLang="en-US"/>
           </a:p>
@@ -2435,7 +2435,7 @@
           <a:p>
             <a:fld id="{E2AD0C2F-5F10-419C-AFC0-158EC5865B11}" type="datetimeFigureOut">
               <a:rPr lang="ko-KR" altLang="en-US" smtClean="0"/>
-              <a:t>2022-07-11</a:t>
+              <a:t>2022-09-29</a:t>
             </a:fld>
             <a:endParaRPr lang="ko-KR" altLang="en-US"/>
           </a:p>
@@ -2548,7 +2548,7 @@
           <a:p>
             <a:fld id="{E2AD0C2F-5F10-419C-AFC0-158EC5865B11}" type="datetimeFigureOut">
               <a:rPr lang="ko-KR" altLang="en-US" smtClean="0"/>
-              <a:t>2022-07-11</a:t>
+              <a:t>2022-09-29</a:t>
             </a:fld>
             <a:endParaRPr lang="ko-KR" altLang="en-US"/>
           </a:p>
@@ -2859,7 +2859,7 @@
           <a:p>
             <a:fld id="{E2AD0C2F-5F10-419C-AFC0-158EC5865B11}" type="datetimeFigureOut">
               <a:rPr lang="ko-KR" altLang="en-US" smtClean="0"/>
-              <a:t>2022-07-11</a:t>
+              <a:t>2022-09-29</a:t>
             </a:fld>
             <a:endParaRPr lang="ko-KR" altLang="en-US"/>
           </a:p>
@@ -3147,7 +3147,7 @@
           <a:p>
             <a:fld id="{E2AD0C2F-5F10-419C-AFC0-158EC5865B11}" type="datetimeFigureOut">
               <a:rPr lang="ko-KR" altLang="en-US" smtClean="0"/>
-              <a:t>2022-07-11</a:t>
+              <a:t>2022-09-29</a:t>
             </a:fld>
             <a:endParaRPr lang="ko-KR" altLang="en-US"/>
           </a:p>
@@ -3388,7 +3388,7 @@
           <a:p>
             <a:fld id="{E2AD0C2F-5F10-419C-AFC0-158EC5865B11}" type="datetimeFigureOut">
               <a:rPr lang="ko-KR" altLang="en-US" smtClean="0"/>
-              <a:t>2022-07-11</a:t>
+              <a:t>2022-09-29</a:t>
             </a:fld>
             <a:endParaRPr lang="ko-KR" altLang="en-US"/>
           </a:p>

</xml_diff>